<commit_message>
Selection of GD, BUCK and LDO
</commit_message>
<xml_diff>
--- a/docs/Abreviations.pptx
+++ b/docs/Abreviations.pptx
@@ -121,6 +121,11 @@
       </a:defRPr>
     </a:lvl9pPr>
   </p:defaultTextStyle>
+  <p:extLst>
+    <p:ext uri="{EFAFB233-063F-42B5-8137-9DF3F51BA10A}">
+      <p15:sldGuideLst xmlns:p15="http://schemas.microsoft.com/office/powerpoint/2012/main"/>
+    </p:ext>
+  </p:extLst>
 </p:presentation>
 </file>
 
@@ -273,7 +278,7 @@
           <a:p>
             <a:fld id="{BFC5A747-05FF-416F-8FE2-30F3026950BD}" type="datetimeFigureOut">
               <a:rPr lang="en-US" smtClean="0"/>
-              <a:t>13-Jan-26</a:t>
+              <a:t>18-Jan-26</a:t>
             </a:fld>
             <a:endParaRPr lang="en-US"/>
           </a:p>
@@ -473,7 +478,7 @@
           <a:p>
             <a:fld id="{BFC5A747-05FF-416F-8FE2-30F3026950BD}" type="datetimeFigureOut">
               <a:rPr lang="en-US" smtClean="0"/>
-              <a:t>13-Jan-26</a:t>
+              <a:t>18-Jan-26</a:t>
             </a:fld>
             <a:endParaRPr lang="en-US"/>
           </a:p>
@@ -683,7 +688,7 @@
           <a:p>
             <a:fld id="{BFC5A747-05FF-416F-8FE2-30F3026950BD}" type="datetimeFigureOut">
               <a:rPr lang="en-US" smtClean="0"/>
-              <a:t>13-Jan-26</a:t>
+              <a:t>18-Jan-26</a:t>
             </a:fld>
             <a:endParaRPr lang="en-US"/>
           </a:p>
@@ -883,7 +888,7 @@
           <a:p>
             <a:fld id="{BFC5A747-05FF-416F-8FE2-30F3026950BD}" type="datetimeFigureOut">
               <a:rPr lang="en-US" smtClean="0"/>
-              <a:t>13-Jan-26</a:t>
+              <a:t>18-Jan-26</a:t>
             </a:fld>
             <a:endParaRPr lang="en-US"/>
           </a:p>
@@ -1159,7 +1164,7 @@
           <a:p>
             <a:fld id="{BFC5A747-05FF-416F-8FE2-30F3026950BD}" type="datetimeFigureOut">
               <a:rPr lang="en-US" smtClean="0"/>
-              <a:t>13-Jan-26</a:t>
+              <a:t>18-Jan-26</a:t>
             </a:fld>
             <a:endParaRPr lang="en-US"/>
           </a:p>
@@ -1427,7 +1432,7 @@
           <a:p>
             <a:fld id="{BFC5A747-05FF-416F-8FE2-30F3026950BD}" type="datetimeFigureOut">
               <a:rPr lang="en-US" smtClean="0"/>
-              <a:t>13-Jan-26</a:t>
+              <a:t>18-Jan-26</a:t>
             </a:fld>
             <a:endParaRPr lang="en-US"/>
           </a:p>
@@ -1842,7 +1847,7 @@
           <a:p>
             <a:fld id="{BFC5A747-05FF-416F-8FE2-30F3026950BD}" type="datetimeFigureOut">
               <a:rPr lang="en-US" smtClean="0"/>
-              <a:t>13-Jan-26</a:t>
+              <a:t>18-Jan-26</a:t>
             </a:fld>
             <a:endParaRPr lang="en-US"/>
           </a:p>
@@ -1984,7 +1989,7 @@
           <a:p>
             <a:fld id="{BFC5A747-05FF-416F-8FE2-30F3026950BD}" type="datetimeFigureOut">
               <a:rPr lang="en-US" smtClean="0"/>
-              <a:t>13-Jan-26</a:t>
+              <a:t>18-Jan-26</a:t>
             </a:fld>
             <a:endParaRPr lang="en-US"/>
           </a:p>
@@ -2097,7 +2102,7 @@
           <a:p>
             <a:fld id="{BFC5A747-05FF-416F-8FE2-30F3026950BD}" type="datetimeFigureOut">
               <a:rPr lang="en-US" smtClean="0"/>
-              <a:t>13-Jan-26</a:t>
+              <a:t>18-Jan-26</a:t>
             </a:fld>
             <a:endParaRPr lang="en-US"/>
           </a:p>
@@ -2410,7 +2415,7 @@
           <a:p>
             <a:fld id="{BFC5A747-05FF-416F-8FE2-30F3026950BD}" type="datetimeFigureOut">
               <a:rPr lang="en-US" smtClean="0"/>
-              <a:t>13-Jan-26</a:t>
+              <a:t>18-Jan-26</a:t>
             </a:fld>
             <a:endParaRPr lang="en-US"/>
           </a:p>
@@ -2699,7 +2704,7 @@
           <a:p>
             <a:fld id="{BFC5A747-05FF-416F-8FE2-30F3026950BD}" type="datetimeFigureOut">
               <a:rPr lang="en-US" smtClean="0"/>
-              <a:t>13-Jan-26</a:t>
+              <a:t>18-Jan-26</a:t>
             </a:fld>
             <a:endParaRPr lang="en-US"/>
           </a:p>
@@ -2942,7 +2947,7 @@
           <a:p>
             <a:fld id="{BFC5A747-05FF-416F-8FE2-30F3026950BD}" type="datetimeFigureOut">
               <a:rPr lang="en-US" smtClean="0"/>
-              <a:t>13-Jan-26</a:t>
+              <a:t>18-Jan-26</a:t>
             </a:fld>
             <a:endParaRPr lang="en-US"/>
           </a:p>
@@ -3381,8 +3386,8 @@
           <a:lstStyle/>
           <a:p>
             <a:r>
-              <a:rPr lang="fr-FR" dirty="0"/>
-              <a:t>Abreviations.md</a:t>
+              <a:rPr lang="fr-FR" dirty="0" err="1"/>
+              <a:t>Abreviations</a:t>
             </a:r>
             <a:endParaRPr lang="en-US" dirty="0"/>
           </a:p>

</xml_diff>

<commit_message>
Buck Engineering Notes update
</commit_message>
<xml_diff>
--- a/docs/Abreviations.pptx
+++ b/docs/Abreviations.pptx
@@ -278,7 +278,7 @@
           <a:p>
             <a:fld id="{BFC5A747-05FF-416F-8FE2-30F3026950BD}" type="datetimeFigureOut">
               <a:rPr lang="en-US" smtClean="0"/>
-              <a:t>18-Jan-26</a:t>
+              <a:t>22-Jan-26</a:t>
             </a:fld>
             <a:endParaRPr lang="en-US"/>
           </a:p>
@@ -478,7 +478,7 @@
           <a:p>
             <a:fld id="{BFC5A747-05FF-416F-8FE2-30F3026950BD}" type="datetimeFigureOut">
               <a:rPr lang="en-US" smtClean="0"/>
-              <a:t>18-Jan-26</a:t>
+              <a:t>22-Jan-26</a:t>
             </a:fld>
             <a:endParaRPr lang="en-US"/>
           </a:p>
@@ -688,7 +688,7 @@
           <a:p>
             <a:fld id="{BFC5A747-05FF-416F-8FE2-30F3026950BD}" type="datetimeFigureOut">
               <a:rPr lang="en-US" smtClean="0"/>
-              <a:t>18-Jan-26</a:t>
+              <a:t>22-Jan-26</a:t>
             </a:fld>
             <a:endParaRPr lang="en-US"/>
           </a:p>
@@ -888,7 +888,7 @@
           <a:p>
             <a:fld id="{BFC5A747-05FF-416F-8FE2-30F3026950BD}" type="datetimeFigureOut">
               <a:rPr lang="en-US" smtClean="0"/>
-              <a:t>18-Jan-26</a:t>
+              <a:t>22-Jan-26</a:t>
             </a:fld>
             <a:endParaRPr lang="en-US"/>
           </a:p>
@@ -1164,7 +1164,7 @@
           <a:p>
             <a:fld id="{BFC5A747-05FF-416F-8FE2-30F3026950BD}" type="datetimeFigureOut">
               <a:rPr lang="en-US" smtClean="0"/>
-              <a:t>18-Jan-26</a:t>
+              <a:t>22-Jan-26</a:t>
             </a:fld>
             <a:endParaRPr lang="en-US"/>
           </a:p>
@@ -1432,7 +1432,7 @@
           <a:p>
             <a:fld id="{BFC5A747-05FF-416F-8FE2-30F3026950BD}" type="datetimeFigureOut">
               <a:rPr lang="en-US" smtClean="0"/>
-              <a:t>18-Jan-26</a:t>
+              <a:t>22-Jan-26</a:t>
             </a:fld>
             <a:endParaRPr lang="en-US"/>
           </a:p>
@@ -1847,7 +1847,7 @@
           <a:p>
             <a:fld id="{BFC5A747-05FF-416F-8FE2-30F3026950BD}" type="datetimeFigureOut">
               <a:rPr lang="en-US" smtClean="0"/>
-              <a:t>18-Jan-26</a:t>
+              <a:t>22-Jan-26</a:t>
             </a:fld>
             <a:endParaRPr lang="en-US"/>
           </a:p>
@@ -1989,7 +1989,7 @@
           <a:p>
             <a:fld id="{BFC5A747-05FF-416F-8FE2-30F3026950BD}" type="datetimeFigureOut">
               <a:rPr lang="en-US" smtClean="0"/>
-              <a:t>18-Jan-26</a:t>
+              <a:t>22-Jan-26</a:t>
             </a:fld>
             <a:endParaRPr lang="en-US"/>
           </a:p>
@@ -2102,7 +2102,7 @@
           <a:p>
             <a:fld id="{BFC5A747-05FF-416F-8FE2-30F3026950BD}" type="datetimeFigureOut">
               <a:rPr lang="en-US" smtClean="0"/>
-              <a:t>18-Jan-26</a:t>
+              <a:t>22-Jan-26</a:t>
             </a:fld>
             <a:endParaRPr lang="en-US"/>
           </a:p>
@@ -2415,7 +2415,7 @@
           <a:p>
             <a:fld id="{BFC5A747-05FF-416F-8FE2-30F3026950BD}" type="datetimeFigureOut">
               <a:rPr lang="en-US" smtClean="0"/>
-              <a:t>18-Jan-26</a:t>
+              <a:t>22-Jan-26</a:t>
             </a:fld>
             <a:endParaRPr lang="en-US"/>
           </a:p>
@@ -2704,7 +2704,7 @@
           <a:p>
             <a:fld id="{BFC5A747-05FF-416F-8FE2-30F3026950BD}" type="datetimeFigureOut">
               <a:rPr lang="en-US" smtClean="0"/>
-              <a:t>18-Jan-26</a:t>
+              <a:t>22-Jan-26</a:t>
             </a:fld>
             <a:endParaRPr lang="en-US"/>
           </a:p>
@@ -2947,7 +2947,7 @@
           <a:p>
             <a:fld id="{BFC5A747-05FF-416F-8FE2-30F3026950BD}" type="datetimeFigureOut">
               <a:rPr lang="en-US" smtClean="0"/>
-              <a:t>18-Jan-26</a:t>
+              <a:t>22-Jan-26</a:t>
             </a:fld>
             <a:endParaRPr lang="en-US"/>
           </a:p>
@@ -18077,8 +18077,58 @@
               </a:spcBef>
             </a:pPr>
             <a:r>
-              <a:rPr lang="fr-FR" sz="1300" dirty="0"/>
-              <a:t>AHB: Advanced High-performance Bus</a:t>
+              <a:rPr lang="fr-FR" sz="1300" b="1" dirty="0"/>
+              <a:t>AHB</a:t>
+            </a:r>
+            <a:r>
+              <a:rPr lang="fr-FR" sz="1300" dirty="0"/>
+              <a:t>: Advanced High-performance Bus</a:t>
+            </a:r>
+          </a:p>
+          <a:p>
+            <a:pPr>
+              <a:spcBef>
+                <a:spcPts val="100"/>
+              </a:spcBef>
+            </a:pPr>
+            <a:r>
+              <a:rPr lang="fr-FR" sz="1300" b="1" dirty="0"/>
+              <a:t>DCM</a:t>
+            </a:r>
+            <a:r>
+              <a:rPr lang="fr-FR" sz="1300" dirty="0"/>
+              <a:t>: </a:t>
+            </a:r>
+            <a:r>
+              <a:rPr lang="fr-FR" sz="1300" dirty="0" err="1"/>
+              <a:t>Discontinuous</a:t>
+            </a:r>
+            <a:r>
+              <a:rPr lang="fr-FR" sz="1300" dirty="0"/>
+              <a:t> Conduction Mode</a:t>
+            </a:r>
+          </a:p>
+          <a:p>
+            <a:pPr>
+              <a:spcBef>
+                <a:spcPts val="100"/>
+              </a:spcBef>
+            </a:pPr>
+            <a:r>
+              <a:rPr lang="fr-FR" sz="1300" b="1" dirty="0"/>
+              <a:t>CCM</a:t>
+            </a:r>
+            <a:r>
+              <a:rPr lang="fr-FR" sz="1300" dirty="0"/>
+              <a:t>: </a:t>
+            </a:r>
+            <a:r>
+              <a:rPr lang="fr-FR" sz="1300" dirty="0" err="1"/>
+              <a:t>Continuous</a:t>
+            </a:r>
+            <a:r>
+              <a:rPr lang="fr-FR" sz="1300" dirty="0"/>
+              <a:t> Conduction Mode</a:t>
             </a:r>
           </a:p>
           <a:p>

</xml_diff>